<commit_message>
ausarbeitung poster und verteidigung beendet
</commit_message>
<xml_diff>
--- a/docs/Verteidigung/Poster.pptx
+++ b/docs/Verteidigung/Poster.pptx
@@ -4670,7 +4670,7 @@
           <a:p>
             <a:pPr eaLnBrk="1" hangingPunct="1"/>
             <a:r>
-              <a:rPr lang="de-DE" altLang="de-DE">
+              <a:rPr lang="de-DE" altLang="de-DE" dirty="0">
                 <a:latin typeface="Arial" panose="020B0604020202020204" pitchFamily="34" charset="0"/>
               </a:rPr>
               <a:t>Thema:</a:t>
@@ -4678,20 +4678,14 @@
           </a:p>
           <a:p>
             <a:pPr eaLnBrk="1" hangingPunct="1"/>
-            <a:endParaRPr lang="de-DE" altLang="de-DE">
+            <a:endParaRPr lang="de-DE" altLang="de-DE" dirty="0">
               <a:latin typeface="Arial" panose="020B0604020202020204" pitchFamily="34" charset="0"/>
             </a:endParaRPr>
           </a:p>
           <a:p>
             <a:pPr eaLnBrk="1" hangingPunct="1"/>
-            <a:endParaRPr lang="de-DE" altLang="de-DE">
-              <a:latin typeface="Arial" panose="020B0604020202020204" pitchFamily="34" charset="0"/>
-            </a:endParaRPr>
-          </a:p>
-          <a:p>
-            <a:pPr eaLnBrk="1" hangingPunct="1"/>
-            <a:r>
-              <a:rPr lang="de-DE" altLang="de-DE">
+            <a:r>
+              <a:rPr lang="de-DE" altLang="de-DE" dirty="0">
                 <a:latin typeface="Arial" panose="020B0604020202020204" pitchFamily="34" charset="0"/>
               </a:rPr>
               <a:t>Verfasst von:</a:t>
@@ -4700,7 +4694,7 @@
           <a:p>
             <a:pPr eaLnBrk="1" hangingPunct="1"/>
             <a:r>
-              <a:rPr lang="de-DE" altLang="de-DE">
+              <a:rPr lang="de-DE" altLang="de-DE" dirty="0">
                 <a:latin typeface="Arial" panose="020B0604020202020204" pitchFamily="34" charset="0"/>
               </a:rPr>
               <a:t>Betreuerin:</a:t>
@@ -4709,10 +4703,19 @@
           <a:p>
             <a:pPr eaLnBrk="1" hangingPunct="1"/>
             <a:r>
-              <a:rPr lang="de-DE" altLang="de-DE">
+              <a:rPr lang="de-DE" altLang="de-DE" dirty="0">
                 <a:latin typeface="Arial" panose="020B0604020202020204" pitchFamily="34" charset="0"/>
               </a:rPr>
               <a:t>2. Gutachter:</a:t>
+            </a:r>
+          </a:p>
+          <a:p>
+            <a:pPr eaLnBrk="1" hangingPunct="1"/>
+            <a:r>
+              <a:rPr lang="de-DE" altLang="de-DE" dirty="0">
+                <a:latin typeface="Arial" panose="020B0604020202020204" pitchFamily="34" charset="0"/>
+              </a:rPr>
+              <a:t>Kontakt E-Mail:</a:t>
             </a:r>
           </a:p>
         </p:txBody>
@@ -4885,12 +4888,6 @@
           </a:p>
           <a:p>
             <a:pPr eaLnBrk="1" hangingPunct="1"/>
-            <a:endParaRPr lang="de-DE" altLang="de-DE" dirty="0">
-              <a:latin typeface="Arial" panose="020B0604020202020204" pitchFamily="34" charset="0"/>
-            </a:endParaRPr>
-          </a:p>
-          <a:p>
-            <a:pPr eaLnBrk="1" hangingPunct="1"/>
             <a:r>
               <a:rPr lang="de-DE" altLang="de-DE" dirty="0">
                 <a:latin typeface="Arial" panose="020B0604020202020204" pitchFamily="34" charset="0"/>
@@ -4916,6 +4913,16 @@
                 <a:cs typeface="Times New Roman" panose="02020603050405020304" pitchFamily="18" charset="0"/>
               </a:rPr>
               <a:t>Prof. Dr.-Ing. Georg Freitag</a:t>
+            </a:r>
+          </a:p>
+          <a:p>
+            <a:pPr eaLnBrk="1" hangingPunct="1"/>
+            <a:r>
+              <a:rPr lang="de-DE" altLang="de-DE" dirty="0">
+                <a:latin typeface="Arial" panose="020B0604020202020204" pitchFamily="34" charset="0"/>
+                <a:cs typeface="Times New Roman" panose="02020603050405020304" pitchFamily="18" charset="0"/>
+              </a:rPr>
+              <a:t>konstantin.coswig@gmail.com</a:t>
             </a:r>
             <a:endParaRPr lang="nn-NO" altLang="de-DE" dirty="0">
               <a:latin typeface="Arial" panose="020B0604020202020204" pitchFamily="34" charset="0"/>
@@ -5303,7 +5310,7 @@
         <p:spPr bwMode="auto">
           <a:xfrm>
             <a:off x="1676400" y="8634414"/>
-            <a:ext cx="9639300" cy="10554988"/>
+            <a:ext cx="9595938" cy="10554988"/>
           </a:xfrm>
           <a:prstGeom prst="rect">
             <a:avLst/>
@@ -5473,7 +5480,7 @@
               <a:rPr lang="de-DE" altLang="de-DE" sz="1800" dirty="0">
                 <a:latin typeface="Arial" panose="020B0604020202020204" pitchFamily="34" charset="0"/>
               </a:rPr>
-              <a:t>Beide Bereiche wurden betrachtet und Anforderung, welche für die Bereiche relevant sind, ermittelt. Für den Bereich der hardwarenahen Programmierung steht die Rechnerkapazitäten-schonende Nutzung im Vordergrund. Dazu wurde für den Prototypen die Programmiersprache C ausgewählt, welche wenig Abstraktion enthält, die Performance-lastig ist. Für den Aspekt der Implementierung von graphischen Benutzeroberflächen wurden verschiedene Software-Konzepte analysiert, beispielsweise das Software-Konzept des Model-View-</a:t>
+              <a:t>Beide Bereiche wurden betrachtet und Anforderung, welche für die Bereiche relevant sind, ermittelt. Für den Bereich der hardwarenahen Programmierung steht die Rechnerkapazitäten-schonende Nutzung im Vordergrund. Dazu wurde für die Technologie die Programmiersprache C ausgewählt, welche wenig Abstraktion enthält, die Performance-lastig ist. Für den Aspekt der Implementierung von graphischen Benutzeroberflächen wurden verschiedene Software-Konzepte analysiert, beispielsweise das Software-Konzept des Model-View-</a:t>
             </a:r>
             <a:r>
               <a:rPr lang="de-DE" altLang="de-DE" sz="1800" dirty="0" err="1">
@@ -5604,11 +5611,23 @@
           </a:p>
           <a:p>
             <a:pPr algn="just" eaLnBrk="1" hangingPunct="1"/>
+            <a:endParaRPr lang="de-DE" altLang="de-DE" sz="1800" dirty="0">
+              <a:latin typeface="Arial" panose="020B0604020202020204" pitchFamily="34" charset="0"/>
+            </a:endParaRPr>
+          </a:p>
+          <a:p>
+            <a:pPr algn="just" eaLnBrk="1" hangingPunct="1"/>
+            <a:endParaRPr lang="de-DE" altLang="de-DE" sz="1800" dirty="0">
+              <a:latin typeface="Arial" panose="020B0604020202020204" pitchFamily="34" charset="0"/>
+            </a:endParaRPr>
+          </a:p>
+          <a:p>
+            <a:pPr algn="just" eaLnBrk="1" hangingPunct="1"/>
             <a:r>
               <a:rPr lang="de-DE" altLang="de-DE" sz="1800" dirty="0">
                 <a:latin typeface="Arial" panose="020B0604020202020204" pitchFamily="34" charset="0"/>
               </a:rPr>
-              <a:t>Dieses Software-Konzept wurde für den Prototypen verwendet. Um einen gewissen Entwicklerkomfort zu bieten wurde die Imps Engine verwendet um eine Objektorientierte Programmierung in C zu ermöglichen.</a:t>
+              <a:t>Dieses Software-Konzept wurde für den Prototypen verwendet. Für eine Objektorientierte Programmierung in C wurde die Imps Engine verwendet.</a:t>
             </a:r>
           </a:p>
         </p:txBody>
@@ -5785,7 +5804,7 @@
               <a:rPr lang="de-DE" altLang="de-DE" sz="1800" dirty="0">
                 <a:latin typeface="Arial" panose="020B0604020202020204" pitchFamily="34" charset="0"/>
               </a:rPr>
-              <a:t>Es konnte eine neue Technologie entworfen werden, welche eine hardwarenahe Entwicklung von Benutzeroberflächen unter Verwendung moderner Software-Konzepte ermöglicht. Es konnte nachgewiesen werden, dass sich diese Lösung von bisherigen Technologien unterscheidet und somit anwendungsfallspezifisch einen Mehrwert darstellen kann.</a:t>
+              <a:t>Es konnte eine neue Technologie Flower entworfen werden, welche eine hardwarenahe Entwicklung von Benutzeroberflächen unter Verwendung moderner Software-Konzepte ermöglicht. Durch die prototypische Entwicklung konnte eine Reihe von Lösungskonzepten validiert werden, welche in die Technologie integriert wurden. Weiterhin konnte durch einen Vergleich nachgewiesen werden, dass sich Flower von bisherigen Technologien unterscheidet und somit anwendungsfallspezifisch einen Mehrwert darstellt.</a:t>
             </a:r>
           </a:p>
           <a:p>
@@ -5825,8 +5844,8 @@
         </p:blipFill>
         <p:spPr bwMode="auto">
           <a:xfrm>
-            <a:off x="4261644" y="14148667"/>
-            <a:ext cx="3721100" cy="3327400"/>
+            <a:off x="4349936" y="14266247"/>
+            <a:ext cx="4101728" cy="3667757"/>
           </a:xfrm>
           <a:prstGeom prst="rect">
             <a:avLst/>
@@ -5885,8 +5904,8 @@
         </p:blipFill>
         <p:spPr bwMode="auto">
           <a:xfrm>
-            <a:off x="11785855" y="19940204"/>
-            <a:ext cx="8689543" cy="7609662"/>
+            <a:off x="11666130" y="20197514"/>
+            <a:ext cx="8818877" cy="7722923"/>
           </a:xfrm>
           <a:prstGeom prst="rect">
             <a:avLst/>
@@ -5932,8 +5951,8 @@
         </p:nvSpPr>
         <p:spPr bwMode="auto">
           <a:xfrm>
-            <a:off x="11315700" y="8634414"/>
-            <a:ext cx="9639300" cy="10554988"/>
+            <a:off x="11272338" y="8634414"/>
+            <a:ext cx="9606462" cy="10554988"/>
           </a:xfrm>
           <a:prstGeom prst="rect">
             <a:avLst/>
@@ -6100,19 +6119,7 @@
               <a:rPr lang="de-DE" altLang="de-DE" sz="1800" dirty="0">
                 <a:latin typeface="Arial" panose="020B0604020202020204" pitchFamily="34" charset="0"/>
               </a:rPr>
-              <a:t>“) finden Anwendung in Technologien zur Implementierung von Benutzeroberflächen, beispielsweise die Auszeichnungssprache Extensible </a:t>
-            </a:r>
-            <a:r>
-              <a:rPr lang="de-DE" altLang="de-DE" sz="1800" dirty="0" err="1">
-                <a:latin typeface="Arial" panose="020B0604020202020204" pitchFamily="34" charset="0"/>
-              </a:rPr>
-              <a:t>Application</a:t>
-            </a:r>
-            <a:r>
-              <a:rPr lang="de-DE" altLang="de-DE" sz="1800" dirty="0">
-                <a:latin typeface="Arial" panose="020B0604020202020204" pitchFamily="34" charset="0"/>
-              </a:rPr>
-              <a:t> Markup Language (XAML) in der Technologie Windows </a:t>
+              <a:t>“) finden Anwendung in Technologien zur Implementierung von Benutzeroberflächen, beispielsweise XAML in der Technologie Windows </a:t>
             </a:r>
             <a:r>
               <a:rPr lang="de-DE" altLang="de-DE" sz="1800" dirty="0" err="1">
@@ -6124,7 +6131,7 @@
               <a:rPr lang="de-DE" altLang="de-DE" sz="1800" dirty="0">
                 <a:latin typeface="Arial" panose="020B0604020202020204" pitchFamily="34" charset="0"/>
               </a:rPr>
-              <a:t> Forms (WPF).</a:t>
+              <a:t> Forms (WPF) von Microsoft.</a:t>
             </a:r>
           </a:p>
           <a:p>
@@ -6139,8 +6146,14 @@
               <a:rPr lang="de-DE" altLang="de-DE" sz="1800" dirty="0">
                 <a:latin typeface="Arial" panose="020B0604020202020204" pitchFamily="34" charset="0"/>
               </a:rPr>
-              <a:t>Deswegen wurden sie im Rahmen der Diplomarbeit näher betrachtet und die Auszeichnungssprache YAML in die neu zu entwickelnde Technologie integriert. YAML wurde aus persönlicher Präferenz gewählt und weil die menschliche Lesbarkeit bei dieser Auszeichnungssprache im Vordergrund steht. Letzteres vereinfacht die Arbeit direkt an YAML-Dateien ohne graphischen Editor. Die Auszeichnungssprache dient dabei der Objekterstellung und wird wie folgt in die Technologie integriert:</a:t>
-            </a:r>
+              <a:t>Aus diesem Grund wurden sie im Rahmen der Diplomarbeit näher betrachtet und die Auszeichnungssprache YAML in die neu zu entwickelnde Technologie integriert. YAML wurde aus persönlicher Präferenz gewählt und weil die menschliche Lesbarkeit bei dieser Auszeichnungssprache im Vordergrund steht. Letzteres vereinfacht die Arbeit direkt an YAML-Dateien ohne graphischen Editor. Die Auszeichnungssprache dient dabei der Objekterstellung und wird wie folgt in die Technologie integriert:</a:t>
+            </a:r>
+          </a:p>
+          <a:p>
+            <a:pPr algn="just" eaLnBrk="1" hangingPunct="1"/>
+            <a:endParaRPr lang="de-DE" altLang="de-DE" sz="1800" dirty="0">
+              <a:latin typeface="Arial" panose="020B0604020202020204" pitchFamily="34" charset="0"/>
+            </a:endParaRPr>
           </a:p>
           <a:p>
             <a:pPr algn="just" eaLnBrk="1" hangingPunct="1"/>
@@ -6214,7 +6227,7 @@
               <a:rPr lang="de-DE" altLang="de-DE" sz="1800" dirty="0">
                 <a:latin typeface="Arial" panose="020B0604020202020204" pitchFamily="34" charset="0"/>
               </a:rPr>
-              <a:t>Wie in der Abbildung zu erkennen ist, wird aus einer YAML-Datei neuer Quellcode generiert. Der generierte Quellcode kann von außerhalb eingebunden und verwendet werden.   Dies   ist   durch   den   Block   Quellcode   rechts   unten   in   der  Abbildung visualisiert. Weiterhin ist festzuhalten, dass in den Schritt der Generierung zugrunde liegender Programmcode mit einbezogen wird. Dies bedeutet, dass die Funktionalität, welche bereits im Quellcode implementiert wurde, Auswirkungen auf das Generierungs-Verhalten hat. So können Klassen, Funktionen und Konstanten, welche im Quellcode hinterlegt sind innerhalb der YAML-Dateien verwendet werden.</a:t>
+              <a:t>Wie in der Abbildung zu erkennen ist, wird aus einer YAML-Datei neuer Quellcode generiert. Der generierte Quellcode kann von außerhalb eingebunden und verwendet werden.   Dies   ist   durch   den   Block   Quellcode   rechts   unten   in   der  Abbildung visualisiert. Weiterhin ist festzuhalten, dass in den Schritt der Generierung zugrunde liegender Programmcode mit einbezogen wird. Dies bedeutet, dass die Funktionalität, welche bereits im Quellcode implementiert wurde, Auswirkungen auf das Generierungs-Verhalten hat. So können Klassen, Funktionen und Konstanten, welche im Quellcode hinterlegt sind innerhalb der YAML-Dateien wiederverwendet werden.</a:t>
             </a:r>
           </a:p>
           <a:p>
@@ -6229,7 +6242,7 @@
               <a:rPr lang="de-DE" altLang="de-DE" sz="1800" dirty="0">
                 <a:latin typeface="Arial" panose="020B0604020202020204" pitchFamily="34" charset="0"/>
               </a:rPr>
-              <a:t>YAML ist wie andere Auszeichnungssprachen, beispielsweise HTML oder XML hierarchisch aufgebaut.</a:t>
+              <a:t>YAML ist wie andere Auszeichnungssprachen, beispielsweise HTML oder XML hierarchisch aufgebaut. Dadurch lassen sich Hierarchien von graphischen Elementen, insbesondere Layouts, gut abbilden.</a:t>
             </a:r>
           </a:p>
         </p:txBody>
@@ -6250,8 +6263,8 @@
         </p:nvSpPr>
         <p:spPr bwMode="auto">
           <a:xfrm>
-            <a:off x="1687994" y="19189402"/>
-            <a:ext cx="19267005" cy="9165973"/>
+            <a:off x="1687995" y="19189402"/>
+            <a:ext cx="19202400" cy="9165973"/>
           </a:xfrm>
           <a:prstGeom prst="rect">
             <a:avLst/>
@@ -6406,7 +6419,7 @@
               <a:rPr lang="de-DE" altLang="de-DE" sz="1800" dirty="0">
                 <a:latin typeface="Arial" panose="020B0604020202020204" pitchFamily="34" charset="0"/>
               </a:rPr>
-              <a:t>Für die Prototypische Entwicklung wurde sich an der Applikation „Bosch Smart Home“ von der Robert Bosch GmbH orientiert. In Anlehnung an die Applikation wurde der Screen „</a:t>
+              <a:t>Für die prototypische Entwicklung wurde sich an der Applikation „Bosch Smart Home“ von der Robert Bosch GmbH orientiert. In Anlehnung an die Applikation wurde der Screen „</a:t>
             </a:r>
             <a:r>
               <a:rPr lang="de-DE" altLang="de-DE" sz="1800" dirty="0" err="1">
@@ -6550,194 +6563,8 @@
               <a:rPr lang="de-DE" altLang="de-DE" sz="1800" dirty="0">
                 <a:latin typeface="Arial" panose="020B0604020202020204" pitchFamily="34" charset="0"/>
               </a:rPr>
-              <a:t>In einem ersten Schritt wird Funktionalität generiert um eine objektorientierte Programmierung in C zu ermöglichen. Im zweiten Schritt erfolgt die Generierung der Objekt-Erstellungsalgorithmen aus den YAML-Dateien. Dabei wird sowohl im ersten Schritt als auch im zweiten Schritt C-Quellcode generiert, welcher in das bestehende Programm über sogenannte Header-Dateien eingebunden wird. In einem letzten Schritt erfolgt die reguläre Kompilierung.</a:t>
-            </a:r>
-          </a:p>
-          <a:p>
-            <a:pPr algn="just" eaLnBrk="1" hangingPunct="1"/>
-            <a:endParaRPr lang="de-DE" altLang="de-DE" sz="1800" dirty="0">
-              <a:latin typeface="Arial" panose="020B0604020202020204" pitchFamily="34" charset="0"/>
-            </a:endParaRPr>
-          </a:p>
-          <a:p>
-            <a:pPr algn="just" eaLnBrk="1" hangingPunct="1"/>
-            <a:endParaRPr lang="de-DE" altLang="de-DE" sz="1800" dirty="0">
-              <a:latin typeface="Arial" panose="020B0604020202020204" pitchFamily="34" charset="0"/>
-            </a:endParaRPr>
-          </a:p>
-          <a:p>
-            <a:pPr algn="just" eaLnBrk="1" hangingPunct="1"/>
-            <a:endParaRPr lang="de-DE" altLang="de-DE" sz="1800" dirty="0">
-              <a:latin typeface="Arial" panose="020B0604020202020204" pitchFamily="34" charset="0"/>
-            </a:endParaRPr>
-          </a:p>
-          <a:p>
-            <a:pPr algn="just" eaLnBrk="1" hangingPunct="1"/>
-            <a:endParaRPr lang="de-DE" altLang="de-DE" sz="1800" dirty="0">
-              <a:latin typeface="Arial" panose="020B0604020202020204" pitchFamily="34" charset="0"/>
-            </a:endParaRPr>
-          </a:p>
-          <a:p>
-            <a:pPr algn="just" eaLnBrk="1" hangingPunct="1"/>
-            <a:endParaRPr lang="de-DE" altLang="de-DE" sz="1800" dirty="0">
-              <a:latin typeface="Arial" panose="020B0604020202020204" pitchFamily="34" charset="0"/>
-            </a:endParaRPr>
-          </a:p>
-          <a:p>
-            <a:pPr algn="just" eaLnBrk="1" hangingPunct="1"/>
-            <a:endParaRPr lang="de-DE" altLang="de-DE" sz="1800" dirty="0">
-              <a:latin typeface="Arial" panose="020B0604020202020204" pitchFamily="34" charset="0"/>
-            </a:endParaRPr>
-          </a:p>
-          <a:p>
-            <a:pPr algn="just" eaLnBrk="1" hangingPunct="1"/>
-            <a:endParaRPr lang="de-DE" altLang="de-DE" sz="1800" dirty="0">
-              <a:latin typeface="Arial" panose="020B0604020202020204" pitchFamily="34" charset="0"/>
-            </a:endParaRPr>
-          </a:p>
-          <a:p>
-            <a:pPr algn="just" eaLnBrk="1" hangingPunct="1"/>
-            <a:endParaRPr lang="de-DE" altLang="de-DE" sz="1800" dirty="0">
-              <a:latin typeface="Arial" panose="020B0604020202020204" pitchFamily="34" charset="0"/>
-            </a:endParaRPr>
-          </a:p>
-          <a:p>
-            <a:pPr algn="just" eaLnBrk="1" hangingPunct="1"/>
-            <a:endParaRPr lang="de-DE" altLang="de-DE" sz="1800" dirty="0">
-              <a:latin typeface="Arial" panose="020B0604020202020204" pitchFamily="34" charset="0"/>
-            </a:endParaRPr>
-          </a:p>
-          <a:p>
-            <a:pPr algn="just" eaLnBrk="1" hangingPunct="1"/>
-            <a:endParaRPr lang="de-DE" altLang="de-DE" sz="1800" dirty="0">
-              <a:latin typeface="Arial" panose="020B0604020202020204" pitchFamily="34" charset="0"/>
-            </a:endParaRPr>
-          </a:p>
-          <a:p>
-            <a:pPr algn="just" eaLnBrk="1" hangingPunct="1"/>
-            <a:endParaRPr lang="de-DE" altLang="de-DE" sz="1800" dirty="0">
-              <a:latin typeface="Arial" panose="020B0604020202020204" pitchFamily="34" charset="0"/>
-            </a:endParaRPr>
-          </a:p>
-          <a:p>
-            <a:pPr algn="just" eaLnBrk="1" hangingPunct="1"/>
-            <a:endParaRPr lang="de-DE" altLang="de-DE" sz="1800" dirty="0">
-              <a:latin typeface="Arial" panose="020B0604020202020204" pitchFamily="34" charset="0"/>
-            </a:endParaRPr>
-          </a:p>
-          <a:p>
-            <a:pPr algn="just" eaLnBrk="1" hangingPunct="1"/>
-            <a:endParaRPr lang="de-DE" altLang="de-DE" sz="1800" dirty="0">
-              <a:latin typeface="Arial" panose="020B0604020202020204" pitchFamily="34" charset="0"/>
-            </a:endParaRPr>
-          </a:p>
-          <a:p>
-            <a:pPr algn="just" eaLnBrk="1" hangingPunct="1"/>
-            <a:endParaRPr lang="de-DE" altLang="de-DE" sz="1800" dirty="0">
-              <a:latin typeface="Arial" panose="020B0604020202020204" pitchFamily="34" charset="0"/>
-            </a:endParaRPr>
-          </a:p>
-          <a:p>
-            <a:pPr algn="just" eaLnBrk="1" hangingPunct="1"/>
-            <a:endParaRPr lang="de-DE" altLang="de-DE" sz="1800" dirty="0">
-              <a:latin typeface="Arial" panose="020B0604020202020204" pitchFamily="34" charset="0"/>
-            </a:endParaRPr>
-          </a:p>
-          <a:p>
-            <a:pPr algn="just" eaLnBrk="1" hangingPunct="1"/>
-            <a:endParaRPr lang="de-DE" altLang="de-DE" sz="1800" dirty="0">
-              <a:latin typeface="Arial" panose="020B0604020202020204" pitchFamily="34" charset="0"/>
-            </a:endParaRPr>
-          </a:p>
-          <a:p>
-            <a:pPr algn="just" eaLnBrk="1" hangingPunct="1"/>
-            <a:endParaRPr lang="de-DE" altLang="de-DE" sz="1800" dirty="0">
-              <a:latin typeface="Arial" panose="020B0604020202020204" pitchFamily="34" charset="0"/>
-            </a:endParaRPr>
-          </a:p>
-          <a:p>
-            <a:pPr algn="just" eaLnBrk="1" hangingPunct="1"/>
-            <a:endParaRPr lang="de-DE" altLang="de-DE" sz="1800" dirty="0">
-              <a:latin typeface="Arial" panose="020B0604020202020204" pitchFamily="34" charset="0"/>
-            </a:endParaRPr>
-          </a:p>
-          <a:p>
-            <a:pPr algn="just" eaLnBrk="1" hangingPunct="1"/>
-            <a:endParaRPr lang="de-DE" altLang="de-DE" sz="1800" dirty="0">
-              <a:latin typeface="Arial" panose="020B0604020202020204" pitchFamily="34" charset="0"/>
-            </a:endParaRPr>
-          </a:p>
-          <a:p>
-            <a:pPr algn="just" eaLnBrk="1" hangingPunct="1"/>
-            <a:endParaRPr lang="de-DE" altLang="de-DE" sz="1800" dirty="0">
-              <a:latin typeface="Arial" panose="020B0604020202020204" pitchFamily="34" charset="0"/>
-            </a:endParaRPr>
-          </a:p>
-          <a:p>
-            <a:pPr algn="just" eaLnBrk="1" hangingPunct="1"/>
-            <a:endParaRPr lang="de-DE" altLang="de-DE" sz="1800" dirty="0">
-              <a:latin typeface="Arial" panose="020B0604020202020204" pitchFamily="34" charset="0"/>
-            </a:endParaRPr>
-          </a:p>
-          <a:p>
-            <a:pPr algn="just" eaLnBrk="1" hangingPunct="1"/>
-            <a:endParaRPr lang="de-DE" altLang="de-DE" sz="1800" dirty="0">
-              <a:latin typeface="Arial" panose="020B0604020202020204" pitchFamily="34" charset="0"/>
-            </a:endParaRPr>
-          </a:p>
-          <a:p>
-            <a:pPr algn="just" eaLnBrk="1" hangingPunct="1"/>
-            <a:endParaRPr lang="de-DE" altLang="de-DE" sz="1800" dirty="0">
-              <a:latin typeface="Arial" panose="020B0604020202020204" pitchFamily="34" charset="0"/>
-            </a:endParaRPr>
-          </a:p>
-          <a:p>
-            <a:pPr algn="just" eaLnBrk="1" hangingPunct="1"/>
-            <a:endParaRPr lang="de-DE" altLang="de-DE" sz="1800" dirty="0">
-              <a:latin typeface="Arial" panose="020B0604020202020204" pitchFamily="34" charset="0"/>
-            </a:endParaRPr>
-          </a:p>
-          <a:p>
-            <a:pPr algn="just" eaLnBrk="1" hangingPunct="1"/>
-            <a:endParaRPr lang="de-DE" altLang="de-DE" sz="1800" dirty="0">
-              <a:latin typeface="Arial" panose="020B0604020202020204" pitchFamily="34" charset="0"/>
-            </a:endParaRPr>
-          </a:p>
-          <a:p>
-            <a:pPr algn="just" eaLnBrk="1" hangingPunct="1"/>
-            <a:endParaRPr lang="de-DE" altLang="de-DE" sz="1800" dirty="0">
-              <a:latin typeface="Arial" panose="020B0604020202020204" pitchFamily="34" charset="0"/>
-            </a:endParaRPr>
-          </a:p>
-          <a:p>
-            <a:pPr algn="just" eaLnBrk="1" hangingPunct="1"/>
-            <a:endParaRPr lang="de-DE" altLang="de-DE" sz="1800" dirty="0">
-              <a:latin typeface="Arial" panose="020B0604020202020204" pitchFamily="34" charset="0"/>
-            </a:endParaRPr>
-          </a:p>
-          <a:p>
-            <a:pPr algn="just" eaLnBrk="1" hangingPunct="1"/>
-            <a:endParaRPr lang="de-DE" altLang="de-DE" sz="1800" dirty="0">
-              <a:latin typeface="Arial" panose="020B0604020202020204" pitchFamily="34" charset="0"/>
-            </a:endParaRPr>
-          </a:p>
-          <a:p>
-            <a:pPr algn="just" eaLnBrk="1" hangingPunct="1"/>
-            <a:endParaRPr lang="de-DE" altLang="de-DE" sz="1800" dirty="0">
-              <a:latin typeface="Arial" panose="020B0604020202020204" pitchFamily="34" charset="0"/>
-            </a:endParaRPr>
-          </a:p>
-          <a:p>
-            <a:pPr algn="just" eaLnBrk="1" hangingPunct="1"/>
-            <a:endParaRPr lang="de-DE" altLang="de-DE" sz="1800" dirty="0">
-              <a:latin typeface="Arial" panose="020B0604020202020204" pitchFamily="34" charset="0"/>
-            </a:endParaRPr>
-          </a:p>
-          <a:p>
-            <a:pPr algn="just" eaLnBrk="1" hangingPunct="1"/>
-            <a:endParaRPr lang="de-DE" altLang="de-DE" sz="1800" dirty="0">
-              <a:latin typeface="Arial" panose="020B0604020202020204" pitchFamily="34" charset="0"/>
-            </a:endParaRPr>
+              <a:t>In einem ersten Schritt wird Funktionalität generiert um eine objektorientierte Programmierung in C zu ermöglichen. Im zweiten Schritt erfolgt die Generierung der Objekt-Erstellungsalgorithmen aus den YAML-Dateien. Dabei wird sowohl im ersten Schritt als auch im zweiten Schritt C-Quellcode generiert, welcher in das bestehende Programm über Header-Dateien eingebunden wird. In einem letzten Schritt erfolgt die reguläre Kompilierung.</a:t>
+            </a:r>
           </a:p>
           <a:p>
             <a:pPr algn="just" eaLnBrk="1" hangingPunct="1"/>
@@ -6745,8 +6572,176 @@
               <a:rPr lang="de-DE" altLang="de-DE" sz="1800" dirty="0">
                 <a:latin typeface="Arial" panose="020B0604020202020204" pitchFamily="34" charset="0"/>
               </a:rPr>
-              <a:t>Abbildung 2: Screenshot Flower, Grafiken erstellt durch Martin Krautschick </a:t>
-            </a:r>
+              <a:t>Es folgt ein Screenshot der Anwendung. Die Grafiken wurden durch Martin Krautschick erstellt:</a:t>
+            </a:r>
+          </a:p>
+          <a:p>
+            <a:pPr algn="just" eaLnBrk="1" hangingPunct="1"/>
+            <a:endParaRPr lang="de-DE" altLang="de-DE" sz="1800" dirty="0">
+              <a:latin typeface="Arial" panose="020B0604020202020204" pitchFamily="34" charset="0"/>
+            </a:endParaRPr>
+          </a:p>
+          <a:p>
+            <a:pPr algn="just" eaLnBrk="1" hangingPunct="1"/>
+            <a:endParaRPr lang="de-DE" altLang="de-DE" sz="1800" dirty="0">
+              <a:latin typeface="Arial" panose="020B0604020202020204" pitchFamily="34" charset="0"/>
+            </a:endParaRPr>
+          </a:p>
+          <a:p>
+            <a:pPr algn="just" eaLnBrk="1" hangingPunct="1"/>
+            <a:endParaRPr lang="de-DE" altLang="de-DE" sz="1800" dirty="0">
+              <a:latin typeface="Arial" panose="020B0604020202020204" pitchFamily="34" charset="0"/>
+            </a:endParaRPr>
+          </a:p>
+          <a:p>
+            <a:pPr algn="just" eaLnBrk="1" hangingPunct="1"/>
+            <a:endParaRPr lang="de-DE" altLang="de-DE" sz="1800" dirty="0">
+              <a:latin typeface="Arial" panose="020B0604020202020204" pitchFamily="34" charset="0"/>
+            </a:endParaRPr>
+          </a:p>
+          <a:p>
+            <a:pPr algn="just" eaLnBrk="1" hangingPunct="1"/>
+            <a:endParaRPr lang="de-DE" altLang="de-DE" sz="1800" dirty="0">
+              <a:latin typeface="Arial" panose="020B0604020202020204" pitchFamily="34" charset="0"/>
+            </a:endParaRPr>
+          </a:p>
+          <a:p>
+            <a:pPr algn="just" eaLnBrk="1" hangingPunct="1"/>
+            <a:endParaRPr lang="de-DE" altLang="de-DE" sz="1800" dirty="0">
+              <a:latin typeface="Arial" panose="020B0604020202020204" pitchFamily="34" charset="0"/>
+            </a:endParaRPr>
+          </a:p>
+          <a:p>
+            <a:pPr algn="just" eaLnBrk="1" hangingPunct="1"/>
+            <a:endParaRPr lang="de-DE" altLang="de-DE" sz="1800" dirty="0">
+              <a:latin typeface="Arial" panose="020B0604020202020204" pitchFamily="34" charset="0"/>
+            </a:endParaRPr>
+          </a:p>
+          <a:p>
+            <a:pPr algn="just" eaLnBrk="1" hangingPunct="1"/>
+            <a:endParaRPr lang="de-DE" altLang="de-DE" sz="1800" dirty="0">
+              <a:latin typeface="Arial" panose="020B0604020202020204" pitchFamily="34" charset="0"/>
+            </a:endParaRPr>
+          </a:p>
+          <a:p>
+            <a:pPr algn="just" eaLnBrk="1" hangingPunct="1"/>
+            <a:endParaRPr lang="de-DE" altLang="de-DE" sz="1800" dirty="0">
+              <a:latin typeface="Arial" panose="020B0604020202020204" pitchFamily="34" charset="0"/>
+            </a:endParaRPr>
+          </a:p>
+          <a:p>
+            <a:pPr algn="just" eaLnBrk="1" hangingPunct="1"/>
+            <a:endParaRPr lang="de-DE" altLang="de-DE" sz="1800" dirty="0">
+              <a:latin typeface="Arial" panose="020B0604020202020204" pitchFamily="34" charset="0"/>
+            </a:endParaRPr>
+          </a:p>
+          <a:p>
+            <a:pPr algn="just" eaLnBrk="1" hangingPunct="1"/>
+            <a:endParaRPr lang="de-DE" altLang="de-DE" sz="1800" dirty="0">
+              <a:latin typeface="Arial" panose="020B0604020202020204" pitchFamily="34" charset="0"/>
+            </a:endParaRPr>
+          </a:p>
+          <a:p>
+            <a:pPr algn="just" eaLnBrk="1" hangingPunct="1"/>
+            <a:endParaRPr lang="de-DE" altLang="de-DE" sz="1800" dirty="0">
+              <a:latin typeface="Arial" panose="020B0604020202020204" pitchFamily="34" charset="0"/>
+            </a:endParaRPr>
+          </a:p>
+          <a:p>
+            <a:pPr algn="just" eaLnBrk="1" hangingPunct="1"/>
+            <a:endParaRPr lang="de-DE" altLang="de-DE" sz="1800" dirty="0">
+              <a:latin typeface="Arial" panose="020B0604020202020204" pitchFamily="34" charset="0"/>
+            </a:endParaRPr>
+          </a:p>
+          <a:p>
+            <a:pPr algn="just" eaLnBrk="1" hangingPunct="1"/>
+            <a:endParaRPr lang="de-DE" altLang="de-DE" sz="1800" dirty="0">
+              <a:latin typeface="Arial" panose="020B0604020202020204" pitchFamily="34" charset="0"/>
+            </a:endParaRPr>
+          </a:p>
+          <a:p>
+            <a:pPr algn="just" eaLnBrk="1" hangingPunct="1"/>
+            <a:endParaRPr lang="de-DE" altLang="de-DE" sz="1800" dirty="0">
+              <a:latin typeface="Arial" panose="020B0604020202020204" pitchFamily="34" charset="0"/>
+            </a:endParaRPr>
+          </a:p>
+          <a:p>
+            <a:pPr algn="just" eaLnBrk="1" hangingPunct="1"/>
+            <a:endParaRPr lang="de-DE" altLang="de-DE" sz="1800" dirty="0">
+              <a:latin typeface="Arial" panose="020B0604020202020204" pitchFamily="34" charset="0"/>
+            </a:endParaRPr>
+          </a:p>
+          <a:p>
+            <a:pPr algn="just" eaLnBrk="1" hangingPunct="1"/>
+            <a:endParaRPr lang="de-DE" altLang="de-DE" sz="1800" dirty="0">
+              <a:latin typeface="Arial" panose="020B0604020202020204" pitchFamily="34" charset="0"/>
+            </a:endParaRPr>
+          </a:p>
+          <a:p>
+            <a:pPr algn="just" eaLnBrk="1" hangingPunct="1"/>
+            <a:endParaRPr lang="de-DE" altLang="de-DE" sz="1800" dirty="0">
+              <a:latin typeface="Arial" panose="020B0604020202020204" pitchFamily="34" charset="0"/>
+            </a:endParaRPr>
+          </a:p>
+          <a:p>
+            <a:pPr algn="just" eaLnBrk="1" hangingPunct="1"/>
+            <a:endParaRPr lang="de-DE" altLang="de-DE" sz="1800" dirty="0">
+              <a:latin typeface="Arial" panose="020B0604020202020204" pitchFamily="34" charset="0"/>
+            </a:endParaRPr>
+          </a:p>
+          <a:p>
+            <a:pPr algn="just" eaLnBrk="1" hangingPunct="1"/>
+            <a:endParaRPr lang="de-DE" altLang="de-DE" sz="1800" dirty="0">
+              <a:latin typeface="Arial" panose="020B0604020202020204" pitchFamily="34" charset="0"/>
+            </a:endParaRPr>
+          </a:p>
+          <a:p>
+            <a:pPr algn="just" eaLnBrk="1" hangingPunct="1"/>
+            <a:endParaRPr lang="de-DE" altLang="de-DE" sz="1800" dirty="0">
+              <a:latin typeface="Arial" panose="020B0604020202020204" pitchFamily="34" charset="0"/>
+            </a:endParaRPr>
+          </a:p>
+          <a:p>
+            <a:pPr algn="just" eaLnBrk="1" hangingPunct="1"/>
+            <a:endParaRPr lang="de-DE" altLang="de-DE" sz="1800" dirty="0">
+              <a:latin typeface="Arial" panose="020B0604020202020204" pitchFamily="34" charset="0"/>
+            </a:endParaRPr>
+          </a:p>
+          <a:p>
+            <a:pPr algn="just" eaLnBrk="1" hangingPunct="1"/>
+            <a:endParaRPr lang="de-DE" altLang="de-DE" sz="1800" dirty="0">
+              <a:latin typeface="Arial" panose="020B0604020202020204" pitchFamily="34" charset="0"/>
+            </a:endParaRPr>
+          </a:p>
+          <a:p>
+            <a:pPr algn="just" eaLnBrk="1" hangingPunct="1"/>
+            <a:endParaRPr lang="de-DE" altLang="de-DE" sz="1800" dirty="0">
+              <a:latin typeface="Arial" panose="020B0604020202020204" pitchFamily="34" charset="0"/>
+            </a:endParaRPr>
+          </a:p>
+          <a:p>
+            <a:pPr algn="just" eaLnBrk="1" hangingPunct="1"/>
+            <a:endParaRPr lang="de-DE" altLang="de-DE" sz="1800" dirty="0">
+              <a:latin typeface="Arial" panose="020B0604020202020204" pitchFamily="34" charset="0"/>
+            </a:endParaRPr>
+          </a:p>
+          <a:p>
+            <a:pPr algn="just" eaLnBrk="1" hangingPunct="1"/>
+            <a:endParaRPr lang="de-DE" altLang="de-DE" sz="1800" dirty="0">
+              <a:latin typeface="Arial" panose="020B0604020202020204" pitchFamily="34" charset="0"/>
+            </a:endParaRPr>
+          </a:p>
+          <a:p>
+            <a:pPr algn="just" eaLnBrk="1" hangingPunct="1"/>
+            <a:endParaRPr lang="de-DE" altLang="de-DE" sz="1800" dirty="0">
+              <a:latin typeface="Arial" panose="020B0604020202020204" pitchFamily="34" charset="0"/>
+            </a:endParaRPr>
+          </a:p>
+          <a:p>
+            <a:pPr algn="just" eaLnBrk="1" hangingPunct="1"/>
+            <a:endParaRPr lang="de-DE" altLang="de-DE" sz="1800" dirty="0">
+              <a:latin typeface="Arial" panose="020B0604020202020204" pitchFamily="34" charset="0"/>
+            </a:endParaRPr>
           </a:p>
         </p:txBody>
       </p:sp>
@@ -6772,8 +6767,8 @@
         </p:blipFill>
         <p:spPr>
           <a:xfrm>
-            <a:off x="12107109" y="12636674"/>
-            <a:ext cx="8047037" cy="2322742"/>
+            <a:off x="11675740" y="12580146"/>
+            <a:ext cx="8799658" cy="2539983"/>
           </a:xfrm>
           <a:prstGeom prst="rect">
             <a:avLst/>
@@ -6802,7 +6797,7 @@
         </p:blipFill>
         <p:spPr>
           <a:xfrm>
-            <a:off x="3155568" y="23324800"/>
+            <a:off x="3434174" y="23529082"/>
             <a:ext cx="5933252" cy="2757709"/>
           </a:xfrm>
           <a:prstGeom prst="rect">

</xml_diff>